<commit_message>
Tambahan Slide tentang Jupyter dan Seaborn
</commit_message>
<xml_diff>
--- a/Tugas 1/Tugas 1 Pengantar Python.pptx
+++ b/Tugas 1/Tugas 1 Pengantar Python.pptx
@@ -28,7 +28,15 @@
     <p:sldId id="278" r:id="rId22"/>
     <p:sldId id="274" r:id="rId23"/>
     <p:sldId id="279" r:id="rId24"/>
-    <p:sldId id="266" r:id="rId25"/>
+    <p:sldId id="290" r:id="rId25"/>
+    <p:sldId id="284" r:id="rId26"/>
+    <p:sldId id="285" r:id="rId27"/>
+    <p:sldId id="286" r:id="rId28"/>
+    <p:sldId id="287" r:id="rId29"/>
+    <p:sldId id="288" r:id="rId30"/>
+    <p:sldId id="291" r:id="rId31"/>
+    <p:sldId id="289" r:id="rId32"/>
+    <p:sldId id="266" r:id="rId33"/>
   </p:sldIdLst>
   <p:sldSz cx="12192000" cy="6858000"/>
   <p:notesSz cx="6858000" cy="9144000"/>
@@ -467,7 +475,7 @@
             <a:fld id="{48A87A34-81AB-432B-8DAE-1953F412C126}" type="datetimeFigureOut">
               <a:rPr lang="en-US" smtClean="0"/>
               <a:pPr/>
-              <a:t>3/23/2019</a:t>
+              <a:t>3/30/2019</a:t>
             </a:fld>
             <a:endParaRPr lang="en-US" dirty="0"/>
           </a:p>
@@ -793,7 +801,7 @@
             <a:fld id="{48A87A34-81AB-432B-8DAE-1953F412C126}" type="datetimeFigureOut">
               <a:rPr lang="en-US" smtClean="0"/>
               <a:pPr/>
-              <a:t>3/23/2019</a:t>
+              <a:t>3/30/2019</a:t>
             </a:fld>
             <a:endParaRPr lang="en-US" dirty="0"/>
           </a:p>
@@ -1043,7 +1051,7 @@
             <a:fld id="{48A87A34-81AB-432B-8DAE-1953F412C126}" type="datetimeFigureOut">
               <a:rPr lang="en-US" smtClean="0"/>
               <a:pPr/>
-              <a:t>3/23/2019</a:t>
+              <a:t>3/30/2019</a:t>
             </a:fld>
             <a:endParaRPr lang="en-US" dirty="0"/>
           </a:p>
@@ -1384,7 +1392,7 @@
             <a:fld id="{48A87A34-81AB-432B-8DAE-1953F412C126}" type="datetimeFigureOut">
               <a:rPr lang="en-US" smtClean="0"/>
               <a:pPr/>
-              <a:t>3/23/2019</a:t>
+              <a:t>3/30/2019</a:t>
             </a:fld>
             <a:endParaRPr lang="en-US" dirty="0"/>
           </a:p>
@@ -1733,7 +1741,7 @@
             <a:fld id="{48A87A34-81AB-432B-8DAE-1953F412C126}" type="datetimeFigureOut">
               <a:rPr lang="en-US" smtClean="0"/>
               <a:pPr/>
-              <a:t>3/23/2019</a:t>
+              <a:t>3/30/2019</a:t>
             </a:fld>
             <a:endParaRPr lang="en-US" dirty="0"/>
           </a:p>
@@ -2109,7 +2117,7 @@
             <a:fld id="{48A87A34-81AB-432B-8DAE-1953F412C126}" type="datetimeFigureOut">
               <a:rPr lang="en-US" smtClean="0"/>
               <a:pPr/>
-              <a:t>3/23/2019</a:t>
+              <a:t>3/30/2019</a:t>
             </a:fld>
             <a:endParaRPr lang="en-US" dirty="0"/>
           </a:p>
@@ -2581,7 +2589,7 @@
             <a:fld id="{48A87A34-81AB-432B-8DAE-1953F412C126}" type="datetimeFigureOut">
               <a:rPr lang="en-US" smtClean="0"/>
               <a:pPr/>
-              <a:t>3/23/2019</a:t>
+              <a:t>3/30/2019</a:t>
             </a:fld>
             <a:endParaRPr lang="en-US" dirty="0"/>
           </a:p>
@@ -2788,7 +2796,7 @@
             <a:fld id="{48A87A34-81AB-432B-8DAE-1953F412C126}" type="datetimeFigureOut">
               <a:rPr lang="en-US" smtClean="0"/>
               <a:pPr/>
-              <a:t>3/23/2019</a:t>
+              <a:t>3/30/2019</a:t>
             </a:fld>
             <a:endParaRPr lang="en-US" dirty="0"/>
           </a:p>
@@ -3001,7 +3009,7 @@
             <a:fld id="{48A87A34-81AB-432B-8DAE-1953F412C126}" type="datetimeFigureOut">
               <a:rPr lang="en-US" smtClean="0"/>
               <a:pPr/>
-              <a:t>3/23/2019</a:t>
+              <a:t>3/30/2019</a:t>
             </a:fld>
             <a:endParaRPr lang="en-US" dirty="0"/>
           </a:p>
@@ -3235,7 +3243,7 @@
             <a:fld id="{48A87A34-81AB-432B-8DAE-1953F412C126}" type="datetimeFigureOut">
               <a:rPr lang="en-US" smtClean="0"/>
               <a:pPr/>
-              <a:t>3/23/2019</a:t>
+              <a:t>3/30/2019</a:t>
             </a:fld>
             <a:endParaRPr lang="en-US" dirty="0"/>
           </a:p>
@@ -3485,7 +3493,7 @@
             <a:fld id="{48A87A34-81AB-432B-8DAE-1953F412C126}" type="datetimeFigureOut">
               <a:rPr lang="en-US" smtClean="0"/>
               <a:pPr/>
-              <a:t>3/23/2019</a:t>
+              <a:t>3/30/2019</a:t>
             </a:fld>
             <a:endParaRPr lang="en-US" dirty="0"/>
           </a:p>
@@ -3785,7 +3793,7 @@
             <a:fld id="{48A87A34-81AB-432B-8DAE-1953F412C126}" type="datetimeFigureOut">
               <a:rPr lang="en-US" smtClean="0"/>
               <a:pPr/>
-              <a:t>3/23/2019</a:t>
+              <a:t>3/30/2019</a:t>
             </a:fld>
             <a:endParaRPr lang="en-US" dirty="0"/>
           </a:p>
@@ -4181,7 +4189,7 @@
             <a:fld id="{48A87A34-81AB-432B-8DAE-1953F412C126}" type="datetimeFigureOut">
               <a:rPr lang="en-US" smtClean="0"/>
               <a:pPr/>
-              <a:t>3/23/2019</a:t>
+              <a:t>3/30/2019</a:t>
             </a:fld>
             <a:endParaRPr lang="en-US" dirty="0"/>
           </a:p>
@@ -4332,7 +4340,7 @@
             <a:fld id="{48A87A34-81AB-432B-8DAE-1953F412C126}" type="datetimeFigureOut">
               <a:rPr lang="en-US" smtClean="0"/>
               <a:pPr/>
-              <a:t>3/23/2019</a:t>
+              <a:t>3/30/2019</a:t>
             </a:fld>
             <a:endParaRPr lang="en-US" dirty="0"/>
           </a:p>
@@ -4460,7 +4468,7 @@
             <a:fld id="{48A87A34-81AB-432B-8DAE-1953F412C126}" type="datetimeFigureOut">
               <a:rPr lang="en-US" smtClean="0"/>
               <a:pPr/>
-              <a:t>3/23/2019</a:t>
+              <a:t>3/30/2019</a:t>
             </a:fld>
             <a:endParaRPr lang="en-US" dirty="0"/>
           </a:p>
@@ -4717,7 +4725,7 @@
             <a:fld id="{48A87A34-81AB-432B-8DAE-1953F412C126}" type="datetimeFigureOut">
               <a:rPr lang="en-US" smtClean="0"/>
               <a:pPr/>
-              <a:t>3/23/2019</a:t>
+              <a:t>3/30/2019</a:t>
             </a:fld>
             <a:endParaRPr lang="en-US" dirty="0"/>
           </a:p>
@@ -5034,7 +5042,7 @@
             <a:fld id="{48A87A34-81AB-432B-8DAE-1953F412C126}" type="datetimeFigureOut">
               <a:rPr lang="en-US" smtClean="0"/>
               <a:pPr/>
-              <a:t>3/23/2019</a:t>
+              <a:t>3/30/2019</a:t>
             </a:fld>
             <a:endParaRPr lang="en-US" dirty="0"/>
           </a:p>
@@ -5387,7 +5395,7 @@
             <a:fld id="{48A87A34-81AB-432B-8DAE-1953F412C126}" type="datetimeFigureOut">
               <a:rPr lang="en-US" smtClean="0"/>
               <a:pPr/>
-              <a:t>3/23/2019</a:t>
+              <a:t>3/30/2019</a:t>
             </a:fld>
             <a:endParaRPr lang="en-US" dirty="0"/>
           </a:p>
@@ -9948,7 +9956,13 @@
       </p:grpSpPr>
       <p:sp>
         <p:nvSpPr>
-          <p:cNvPr id="2" name="Title 1"/>
+          <p:cNvPr id="2" name="Judul 1">
+            <a:extLst>
+              <a:ext uri="{FF2B5EF4-FFF2-40B4-BE49-F238E27FC236}">
+                <a16:creationId xmlns:a16="http://schemas.microsoft.com/office/drawing/2014/main" id="{CF32B412-AD7C-438E-96DE-0E515D1A29BB}"/>
+              </a:ext>
+            </a:extLst>
+          </p:cNvPr>
           <p:cNvSpPr>
             <a:spLocks noGrp="1"/>
           </p:cNvSpPr>
@@ -9956,121 +9970,891 @@
             <p:ph type="title"/>
           </p:nvPr>
         </p:nvSpPr>
-        <p:spPr/>
+        <p:spPr>
+          <a:xfrm>
+            <a:off x="1736596" y="893805"/>
+            <a:ext cx="8915399" cy="626076"/>
+          </a:xfrm>
+        </p:spPr>
+        <p:txBody>
+          <a:bodyPr>
+            <a:normAutofit/>
+          </a:bodyPr>
+          <a:lstStyle/>
+          <a:p>
+            <a:pPr algn="ctr"/>
+            <a:r>
+              <a:rPr lang="id-ID" b="1" dirty="0" err="1"/>
+              <a:t>Jupyter</a:t>
+            </a:r>
+            <a:endParaRPr lang="en-US" b="1" dirty="0"/>
+          </a:p>
+        </p:txBody>
+      </p:sp>
+      <p:sp>
+        <p:nvSpPr>
+          <p:cNvPr id="3" name="Tampungan Teks 2">
+            <a:extLst>
+              <a:ext uri="{FF2B5EF4-FFF2-40B4-BE49-F238E27FC236}">
+                <a16:creationId xmlns:a16="http://schemas.microsoft.com/office/drawing/2014/main" id="{D6D857E0-E04F-432A-916B-62FC94E3EC87}"/>
+              </a:ext>
+            </a:extLst>
+          </p:cNvPr>
+          <p:cNvSpPr>
+            <a:spLocks noGrp="1"/>
+          </p:cNvSpPr>
+          <p:nvPr>
+            <p:ph type="body" idx="1"/>
+          </p:nvPr>
+        </p:nvSpPr>
+        <p:spPr>
+          <a:xfrm>
+            <a:off x="1736596" y="2414035"/>
+            <a:ext cx="8915399" cy="1555864"/>
+          </a:xfrm>
+        </p:spPr>
         <p:txBody>
           <a:bodyPr/>
           <a:lstStyle/>
           <a:p>
-            <a:r>
-              <a:rPr lang="en-US" dirty="0" err="1"/>
-              <a:t>Sumber</a:t>
-            </a:r>
-            <a:endParaRPr lang="en-US" dirty="0"/>
-          </a:p>
-        </p:txBody>
-      </p:sp>
-      <p:sp>
-        <p:nvSpPr>
-          <p:cNvPr id="3" name="Content Placeholder 2"/>
-          <p:cNvSpPr>
-            <a:spLocks noGrp="1"/>
-          </p:cNvSpPr>
-          <p:nvPr>
-            <p:ph idx="1"/>
-          </p:nvPr>
-        </p:nvSpPr>
-        <p:spPr>
-          <a:xfrm>
-            <a:off x="1141412" y="2478157"/>
-            <a:ext cx="9905999" cy="3856382"/>
-          </a:xfrm>
-        </p:spPr>
-        <p:txBody>
-          <a:bodyPr>
-            <a:normAutofit lnSpcReduction="10000"/>
-          </a:bodyPr>
-          <a:lstStyle/>
-          <a:p>
+            <a:pPr algn="just"/>
+            <a:r>
+              <a:rPr lang="en-US" dirty="0" err="1">
+                <a:solidFill>
+                  <a:schemeClr val="tx1"/>
+                </a:solidFill>
+              </a:rPr>
+              <a:t>Jupyter</a:t>
+            </a:r>
             <a:r>
               <a:rPr lang="en-US" dirty="0">
-                <a:hlinkClick r:id="rId2"/>
+                <a:solidFill>
+                  <a:schemeClr val="tx1"/>
+                </a:solidFill>
               </a:rPr>
-              <a:t>https://en.wikipedia.org/wiki/Pip_(package_manager)</a:t>
-            </a:r>
-            <a:endParaRPr lang="en-US" dirty="0"/>
-          </a:p>
-          <a:p>
+              <a:t> </a:t>
+            </a:r>
+            <a:r>
+              <a:rPr lang="en-US" dirty="0" err="1">
+                <a:solidFill>
+                  <a:schemeClr val="tx1"/>
+                </a:solidFill>
+              </a:rPr>
+              <a:t>adalah</a:t>
+            </a:r>
             <a:r>
               <a:rPr lang="en-US" dirty="0">
-                <a:hlinkClick r:id="rId3"/>
+                <a:solidFill>
+                  <a:schemeClr val="tx1"/>
+                </a:solidFill>
               </a:rPr>
-              <a:t>https://www.advernesia.com/blog/python/cara-install-python-di-windows-lengkap/</a:t>
-            </a:r>
-            <a:endParaRPr lang="en-US" dirty="0"/>
-          </a:p>
-          <a:p>
+              <a:t> tools yang </a:t>
+            </a:r>
+            <a:r>
+              <a:rPr lang="en-US" dirty="0" err="1">
+                <a:solidFill>
+                  <a:schemeClr val="tx1"/>
+                </a:solidFill>
+              </a:rPr>
+              <a:t>digunakan</a:t>
+            </a:r>
             <a:r>
               <a:rPr lang="en-US" dirty="0">
-                <a:hlinkClick r:id="rId4"/>
+                <a:solidFill>
+                  <a:schemeClr val="tx1"/>
+                </a:solidFill>
               </a:rPr>
-              <a:t>https://www.petanikode.com/python-windows/</a:t>
-            </a:r>
-            <a:endParaRPr lang="en-US" dirty="0"/>
-          </a:p>
-          <a:p>
+              <a:t> </a:t>
+            </a:r>
+            <a:r>
+              <a:rPr lang="en-US" dirty="0" err="1">
+                <a:solidFill>
+                  <a:schemeClr val="tx1"/>
+                </a:solidFill>
+              </a:rPr>
+              <a:t>untuk</a:t>
+            </a:r>
             <a:r>
               <a:rPr lang="en-US" dirty="0">
-                <a:hlinkClick r:id="rId5"/>
+                <a:solidFill>
+                  <a:schemeClr val="tx1"/>
+                </a:solidFill>
               </a:rPr>
-              <a:t>https://belajarpython.com/tutorial/tipe-data-python</a:t>
-            </a:r>
-            <a:endParaRPr lang="en-US" dirty="0"/>
-          </a:p>
-          <a:p>
+              <a:t> </a:t>
+            </a:r>
+            <a:r>
+              <a:rPr lang="en-US" dirty="0" err="1">
+                <a:solidFill>
+                  <a:schemeClr val="tx1"/>
+                </a:solidFill>
+              </a:rPr>
+              <a:t>mendokumentasikan</a:t>
+            </a:r>
             <a:r>
               <a:rPr lang="en-US" dirty="0">
-                <a:hlinkClick r:id="rId6"/>
+                <a:solidFill>
+                  <a:schemeClr val="tx1"/>
+                </a:solidFill>
               </a:rPr>
-              <a:t>https://hiwijaya.com/blog/struktur-data-python/</a:t>
-            </a:r>
-            <a:endParaRPr lang="en-US" dirty="0"/>
-          </a:p>
-          <a:p>
+              <a:t> </a:t>
+            </a:r>
+            <a:r>
+              <a:rPr lang="en-US" dirty="0" err="1">
+                <a:solidFill>
+                  <a:schemeClr val="tx1"/>
+                </a:solidFill>
+              </a:rPr>
+              <a:t>sebuah</a:t>
+            </a:r>
             <a:r>
               <a:rPr lang="en-US" dirty="0">
-                <a:hlinkClick r:id="rId7"/>
+                <a:solidFill>
+                  <a:schemeClr val="tx1"/>
+                </a:solidFill>
               </a:rPr>
-              <a:t>http://sakti.github.io/python101/struktur_data.html</a:t>
-            </a:r>
-            <a:endParaRPr lang="id-ID" dirty="0"/>
-          </a:p>
-          <a:p>
-            <a:r>
-              <a:rPr lang="id-ID" dirty="0">
-                <a:hlinkClick r:id="rId8"/>
+              <a:t> </a:t>
+            </a:r>
+            <a:r>
+              <a:rPr lang="en-US" dirty="0" err="1">
+                <a:solidFill>
+                  <a:schemeClr val="tx1"/>
+                </a:solidFill>
               </a:rPr>
-              <a:t>https://github.com/ardeabagas22/Pengantar-Deep-Learning</a:t>
-            </a:r>
-            <a:r>
-              <a:rPr lang="id-ID" dirty="0"/>
-              <a:t> </a:t>
-            </a:r>
-          </a:p>
-          <a:p>
-            <a:endParaRPr lang="en-US" dirty="0"/>
-          </a:p>
-          <a:p>
-            <a:endParaRPr lang="en-US" dirty="0"/>
-          </a:p>
-          <a:p>
-            <a:endParaRPr lang="en-US" dirty="0"/>
+              <a:t>pekerjaan</a:t>
+            </a:r>
+            <a:r>
+              <a:rPr lang="en-US" dirty="0">
+                <a:solidFill>
+                  <a:schemeClr val="tx1"/>
+                </a:solidFill>
+              </a:rPr>
+              <a:t> (</a:t>
+            </a:r>
+            <a:r>
+              <a:rPr lang="en-US" b="1" dirty="0">
+                <a:solidFill>
+                  <a:schemeClr val="tx1"/>
+                </a:solidFill>
+              </a:rPr>
+              <a:t>code dan </a:t>
+            </a:r>
+            <a:r>
+              <a:rPr lang="en-US" b="1" dirty="0" err="1">
+                <a:solidFill>
+                  <a:schemeClr val="tx1"/>
+                </a:solidFill>
+              </a:rPr>
+              <a:t>penjelasan</a:t>
+            </a:r>
+            <a:r>
+              <a:rPr lang="en-US" b="1" dirty="0">
+                <a:solidFill>
+                  <a:schemeClr val="tx1"/>
+                </a:solidFill>
+              </a:rPr>
+              <a:t> </a:t>
+            </a:r>
+            <a:r>
+              <a:rPr lang="en-US" b="1" dirty="0" err="1">
+                <a:solidFill>
+                  <a:schemeClr val="tx1"/>
+                </a:solidFill>
+              </a:rPr>
+              <a:t>bisa</a:t>
+            </a:r>
+            <a:r>
+              <a:rPr lang="en-US" b="1" dirty="0">
+                <a:solidFill>
+                  <a:schemeClr val="tx1"/>
+                </a:solidFill>
+              </a:rPr>
+              <a:t> </a:t>
+            </a:r>
+            <a:r>
+              <a:rPr lang="en-US" b="1" dirty="0" err="1">
+                <a:solidFill>
+                  <a:schemeClr val="tx1"/>
+                </a:solidFill>
+              </a:rPr>
+              <a:t>dalam</a:t>
+            </a:r>
+            <a:r>
+              <a:rPr lang="en-US" b="1" dirty="0">
+                <a:solidFill>
+                  <a:schemeClr val="tx1"/>
+                </a:solidFill>
+              </a:rPr>
+              <a:t> </a:t>
+            </a:r>
+            <a:r>
+              <a:rPr lang="en-US" b="1" dirty="0" err="1">
+                <a:solidFill>
+                  <a:schemeClr val="tx1"/>
+                </a:solidFill>
+              </a:rPr>
+              <a:t>satu</a:t>
+            </a:r>
+            <a:r>
+              <a:rPr lang="en-US" b="1" dirty="0">
+                <a:solidFill>
+                  <a:schemeClr val="tx1"/>
+                </a:solidFill>
+              </a:rPr>
+              <a:t> </a:t>
+            </a:r>
+            <a:r>
+              <a:rPr lang="en-US" b="1" dirty="0" err="1">
+                <a:solidFill>
+                  <a:schemeClr val="tx1"/>
+                </a:solidFill>
+              </a:rPr>
+              <a:t>halaman</a:t>
+            </a:r>
+            <a:r>
+              <a:rPr lang="en-US" dirty="0">
+                <a:solidFill>
+                  <a:schemeClr val="tx1"/>
+                </a:solidFill>
+              </a:rPr>
+              <a:t>) yang </a:t>
+            </a:r>
+            <a:r>
+              <a:rPr lang="en-US" dirty="0" err="1">
+                <a:solidFill>
+                  <a:schemeClr val="tx1"/>
+                </a:solidFill>
+              </a:rPr>
+              <a:t>kita</a:t>
+            </a:r>
+            <a:r>
+              <a:rPr lang="en-US" dirty="0">
+                <a:solidFill>
+                  <a:schemeClr val="tx1"/>
+                </a:solidFill>
+              </a:rPr>
+              <a:t> </a:t>
+            </a:r>
+            <a:r>
+              <a:rPr lang="en-US" dirty="0" err="1">
+                <a:solidFill>
+                  <a:schemeClr val="tx1"/>
+                </a:solidFill>
+              </a:rPr>
+              <a:t>lakukan</a:t>
+            </a:r>
+            <a:r>
+              <a:rPr lang="en-US" dirty="0">
+                <a:solidFill>
+                  <a:schemeClr val="tx1"/>
+                </a:solidFill>
+              </a:rPr>
+              <a:t> </a:t>
+            </a:r>
+            <a:r>
+              <a:rPr lang="en-US" dirty="0" err="1">
+                <a:solidFill>
+                  <a:schemeClr val="tx1"/>
+                </a:solidFill>
+              </a:rPr>
+              <a:t>dapat</a:t>
+            </a:r>
+            <a:r>
+              <a:rPr lang="en-US" dirty="0">
+                <a:solidFill>
+                  <a:schemeClr val="tx1"/>
+                </a:solidFill>
+              </a:rPr>
+              <a:t> </a:t>
+            </a:r>
+            <a:r>
+              <a:rPr lang="en-US" dirty="0" err="1">
+                <a:solidFill>
+                  <a:schemeClr val="tx1"/>
+                </a:solidFill>
+              </a:rPr>
+              <a:t>disimpan</a:t>
+            </a:r>
+            <a:r>
+              <a:rPr lang="en-US" dirty="0">
+                <a:solidFill>
+                  <a:schemeClr val="tx1"/>
+                </a:solidFill>
+              </a:rPr>
+              <a:t> </a:t>
+            </a:r>
+            <a:r>
+              <a:rPr lang="en-US" dirty="0" err="1">
+                <a:solidFill>
+                  <a:schemeClr val="tx1"/>
+                </a:solidFill>
+              </a:rPr>
+              <a:t>dalam</a:t>
+            </a:r>
+            <a:r>
+              <a:rPr lang="en-US" dirty="0">
+                <a:solidFill>
+                  <a:schemeClr val="tx1"/>
+                </a:solidFill>
+              </a:rPr>
+              <a:t> </a:t>
+            </a:r>
+            <a:r>
+              <a:rPr lang="en-US" dirty="0" err="1">
+                <a:solidFill>
+                  <a:schemeClr val="tx1"/>
+                </a:solidFill>
+              </a:rPr>
+              <a:t>bentuk</a:t>
+            </a:r>
+            <a:r>
+              <a:rPr lang="en-US" dirty="0">
+                <a:solidFill>
+                  <a:schemeClr val="tx1"/>
+                </a:solidFill>
+              </a:rPr>
+              <a:t> </a:t>
+            </a:r>
+            <a:r>
+              <a:rPr lang="en-US" dirty="0" err="1">
+                <a:solidFill>
+                  <a:schemeClr val="tx1"/>
+                </a:solidFill>
+              </a:rPr>
+              <a:t>presentasi</a:t>
+            </a:r>
+            <a:r>
+              <a:rPr lang="en-US" dirty="0">
+                <a:solidFill>
+                  <a:schemeClr val="tx1"/>
+                </a:solidFill>
+              </a:rPr>
+              <a:t> dan </a:t>
+            </a:r>
+            <a:r>
+              <a:rPr lang="en-US" dirty="0" err="1">
+                <a:solidFill>
+                  <a:schemeClr val="tx1"/>
+                </a:solidFill>
+              </a:rPr>
+              <a:t>tampilan</a:t>
+            </a:r>
+            <a:r>
+              <a:rPr lang="en-US" dirty="0">
+                <a:solidFill>
+                  <a:schemeClr val="tx1"/>
+                </a:solidFill>
+              </a:rPr>
+              <a:t> yang </a:t>
+            </a:r>
+            <a:r>
+              <a:rPr lang="en-US" dirty="0" err="1">
+                <a:solidFill>
+                  <a:schemeClr val="tx1"/>
+                </a:solidFill>
+              </a:rPr>
+              <a:t>menarik</a:t>
+            </a:r>
+            <a:r>
+              <a:rPr lang="en-US" dirty="0">
+                <a:solidFill>
+                  <a:schemeClr val="tx1"/>
+                </a:solidFill>
+              </a:rPr>
+              <a:t>.</a:t>
+            </a:r>
           </a:p>
         </p:txBody>
       </p:sp>
     </p:spTree>
     <p:extLst>
       <p:ext uri="{BB962C8B-B14F-4D97-AF65-F5344CB8AC3E}">
-        <p14:creationId xmlns:p14="http://schemas.microsoft.com/office/powerpoint/2010/main" val="692436605"/>
+        <p14:creationId xmlns:p14="http://schemas.microsoft.com/office/powerpoint/2010/main" val="669316959"/>
+      </p:ext>
+    </p:extLst>
+  </p:cSld>
+  <p:clrMapOvr>
+    <a:masterClrMapping/>
+  </p:clrMapOvr>
+</p:sld>
+</file>
+
+<file path=ppt/slides/slide25.xml><?xml version="1.0" encoding="utf-8"?>
+<p:sld xmlns:a="http://schemas.openxmlformats.org/drawingml/2006/main" xmlns:r="http://schemas.openxmlformats.org/officeDocument/2006/relationships" xmlns:p="http://schemas.openxmlformats.org/presentationml/2006/main">
+  <p:cSld>
+    <p:spTree>
+      <p:nvGrpSpPr>
+        <p:cNvPr id="1" name=""/>
+        <p:cNvGrpSpPr/>
+        <p:nvPr/>
+      </p:nvGrpSpPr>
+      <p:grpSpPr>
+        <a:xfrm>
+          <a:off x="0" y="0"/>
+          <a:ext cx="0" cy="0"/>
+          <a:chOff x="0" y="0"/>
+          <a:chExt cx="0" cy="0"/>
+        </a:xfrm>
+      </p:grpSpPr>
+      <p:sp>
+        <p:nvSpPr>
+          <p:cNvPr id="2" name="Judul 1">
+            <a:extLst>
+              <a:ext uri="{FF2B5EF4-FFF2-40B4-BE49-F238E27FC236}">
+                <a16:creationId xmlns:a16="http://schemas.microsoft.com/office/drawing/2014/main" id="{0DCE6C2C-C72B-498F-B26F-86C967FA8315}"/>
+              </a:ext>
+            </a:extLst>
+          </p:cNvPr>
+          <p:cNvSpPr>
+            <a:spLocks noGrp="1"/>
+          </p:cNvSpPr>
+          <p:nvPr>
+            <p:ph type="title"/>
+          </p:nvPr>
+        </p:nvSpPr>
+        <p:spPr>
+          <a:xfrm>
+            <a:off x="1971370" y="782594"/>
+            <a:ext cx="8915399" cy="613719"/>
+          </a:xfrm>
+        </p:spPr>
+        <p:txBody>
+          <a:bodyPr>
+            <a:noAutofit/>
+          </a:bodyPr>
+          <a:lstStyle/>
+          <a:p>
+            <a:r>
+              <a:rPr lang="id-ID" sz="4300" b="1" dirty="0"/>
+              <a:t>Instalasi </a:t>
+            </a:r>
+            <a:r>
+              <a:rPr lang="id-ID" sz="4300" b="1" dirty="0" err="1"/>
+              <a:t>Jupyter</a:t>
+            </a:r>
+            <a:r>
+              <a:rPr lang="id-ID" sz="4300" b="1" dirty="0"/>
+              <a:t> Pada </a:t>
+            </a:r>
+            <a:r>
+              <a:rPr lang="id-ID" sz="4300" b="1" dirty="0" err="1"/>
+              <a:t>Pyhton</a:t>
+            </a:r>
+            <a:endParaRPr lang="en-US" sz="4300" b="1" dirty="0"/>
+          </a:p>
+        </p:txBody>
+      </p:sp>
+      <p:pic>
+        <p:nvPicPr>
+          <p:cNvPr id="4" name="Gambar 3">
+            <a:extLst>
+              <a:ext uri="{FF2B5EF4-FFF2-40B4-BE49-F238E27FC236}">
+                <a16:creationId xmlns:a16="http://schemas.microsoft.com/office/drawing/2014/main" id="{4C6AF203-2A16-4C03-B847-A239D010E581}"/>
+              </a:ext>
+            </a:extLst>
+          </p:cNvPr>
+          <p:cNvPicPr/>
+          <p:nvPr/>
+        </p:nvPicPr>
+        <p:blipFill>
+          <a:blip r:embed="rId2"/>
+          <a:stretch>
+            <a:fillRect/>
+          </a:stretch>
+        </p:blipFill>
+        <p:spPr>
+          <a:xfrm>
+            <a:off x="2239661" y="2384988"/>
+            <a:ext cx="7712677" cy="2088024"/>
+          </a:xfrm>
+          <a:prstGeom prst="rect">
+            <a:avLst/>
+          </a:prstGeom>
+        </p:spPr>
+      </p:pic>
+    </p:spTree>
+    <p:extLst>
+      <p:ext uri="{BB962C8B-B14F-4D97-AF65-F5344CB8AC3E}">
+        <p14:creationId xmlns:p14="http://schemas.microsoft.com/office/powerpoint/2010/main" val="3662198218"/>
+      </p:ext>
+    </p:extLst>
+  </p:cSld>
+  <p:clrMapOvr>
+    <a:masterClrMapping/>
+  </p:clrMapOvr>
+</p:sld>
+</file>
+
+<file path=ppt/slides/slide26.xml><?xml version="1.0" encoding="utf-8"?>
+<p:sld xmlns:a="http://schemas.openxmlformats.org/drawingml/2006/main" xmlns:r="http://schemas.openxmlformats.org/officeDocument/2006/relationships" xmlns:p="http://schemas.openxmlformats.org/presentationml/2006/main">
+  <p:cSld>
+    <p:spTree>
+      <p:nvGrpSpPr>
+        <p:cNvPr id="1" name=""/>
+        <p:cNvGrpSpPr/>
+        <p:nvPr/>
+      </p:nvGrpSpPr>
+      <p:grpSpPr>
+        <a:xfrm>
+          <a:off x="0" y="0"/>
+          <a:ext cx="0" cy="0"/>
+          <a:chOff x="0" y="0"/>
+          <a:chExt cx="0" cy="0"/>
+        </a:xfrm>
+      </p:grpSpPr>
+      <p:sp>
+        <p:nvSpPr>
+          <p:cNvPr id="3" name="Tampungan Teks 2">
+            <a:extLst>
+              <a:ext uri="{FF2B5EF4-FFF2-40B4-BE49-F238E27FC236}">
+                <a16:creationId xmlns:a16="http://schemas.microsoft.com/office/drawing/2014/main" id="{C9460BB7-3C03-45CE-9CC4-D3A1FB12B8C3}"/>
+              </a:ext>
+            </a:extLst>
+          </p:cNvPr>
+          <p:cNvSpPr>
+            <a:spLocks noGrp="1"/>
+          </p:cNvSpPr>
+          <p:nvPr>
+            <p:ph type="body" idx="1"/>
+          </p:nvPr>
+        </p:nvSpPr>
+        <p:spPr>
+          <a:xfrm>
+            <a:off x="2700421" y="325743"/>
+            <a:ext cx="8915399" cy="1555864"/>
+          </a:xfrm>
+        </p:spPr>
+        <p:txBody>
+          <a:bodyPr/>
+          <a:lstStyle/>
+          <a:p>
+            <a:endParaRPr lang="en-US" dirty="0"/>
+          </a:p>
+        </p:txBody>
+      </p:sp>
+      <p:pic>
+        <p:nvPicPr>
+          <p:cNvPr id="4" name="Gambar 3">
+            <a:extLst>
+              <a:ext uri="{FF2B5EF4-FFF2-40B4-BE49-F238E27FC236}">
+                <a16:creationId xmlns:a16="http://schemas.microsoft.com/office/drawing/2014/main" id="{FC75A854-27F1-4F47-BBF2-0BEDE2B7D0A0}"/>
+              </a:ext>
+            </a:extLst>
+          </p:cNvPr>
+          <p:cNvPicPr/>
+          <p:nvPr/>
+        </p:nvPicPr>
+        <p:blipFill>
+          <a:blip r:embed="rId2"/>
+          <a:stretch>
+            <a:fillRect/>
+          </a:stretch>
+        </p:blipFill>
+        <p:spPr>
+          <a:xfrm>
+            <a:off x="3301782" y="2167243"/>
+            <a:ext cx="7712676" cy="343599"/>
+          </a:xfrm>
+          <a:prstGeom prst="rect">
+            <a:avLst/>
+          </a:prstGeom>
+        </p:spPr>
+      </p:pic>
+      <p:pic>
+        <p:nvPicPr>
+          <p:cNvPr id="5" name="Gambar 4">
+            <a:extLst>
+              <a:ext uri="{FF2B5EF4-FFF2-40B4-BE49-F238E27FC236}">
+                <a16:creationId xmlns:a16="http://schemas.microsoft.com/office/drawing/2014/main" id="{3F5D4BA9-62EC-4016-8F16-E0F46B3DCA72}"/>
+              </a:ext>
+            </a:extLst>
+          </p:cNvPr>
+          <p:cNvPicPr/>
+          <p:nvPr/>
+        </p:nvPicPr>
+        <p:blipFill>
+          <a:blip r:embed="rId3"/>
+          <a:stretch>
+            <a:fillRect/>
+          </a:stretch>
+        </p:blipFill>
+        <p:spPr>
+          <a:xfrm>
+            <a:off x="2239662" y="1485231"/>
+            <a:ext cx="7712676" cy="4347158"/>
+          </a:xfrm>
+          <a:prstGeom prst="rect">
+            <a:avLst/>
+          </a:prstGeom>
+        </p:spPr>
+      </p:pic>
+    </p:spTree>
+    <p:extLst>
+      <p:ext uri="{BB962C8B-B14F-4D97-AF65-F5344CB8AC3E}">
+        <p14:creationId xmlns:p14="http://schemas.microsoft.com/office/powerpoint/2010/main" val="720088251"/>
+      </p:ext>
+    </p:extLst>
+  </p:cSld>
+  <p:clrMapOvr>
+    <a:masterClrMapping/>
+  </p:clrMapOvr>
+</p:sld>
+</file>
+
+<file path=ppt/slides/slide27.xml><?xml version="1.0" encoding="utf-8"?>
+<p:sld xmlns:a="http://schemas.openxmlformats.org/drawingml/2006/main" xmlns:r="http://schemas.openxmlformats.org/officeDocument/2006/relationships" xmlns:p="http://schemas.openxmlformats.org/presentationml/2006/main">
+  <p:cSld>
+    <p:spTree>
+      <p:nvGrpSpPr>
+        <p:cNvPr id="1" name=""/>
+        <p:cNvGrpSpPr/>
+        <p:nvPr/>
+      </p:nvGrpSpPr>
+      <p:grpSpPr>
+        <a:xfrm>
+          <a:off x="0" y="0"/>
+          <a:ext cx="0" cy="0"/>
+          <a:chOff x="0" y="0"/>
+          <a:chExt cx="0" cy="0"/>
+        </a:xfrm>
+      </p:grpSpPr>
+      <p:sp>
+        <p:nvSpPr>
+          <p:cNvPr id="3" name="Tampungan Teks 2">
+            <a:extLst>
+              <a:ext uri="{FF2B5EF4-FFF2-40B4-BE49-F238E27FC236}">
+                <a16:creationId xmlns:a16="http://schemas.microsoft.com/office/drawing/2014/main" id="{CB616534-EE60-4F4F-8DBE-A7707883D94D}"/>
+              </a:ext>
+            </a:extLst>
+          </p:cNvPr>
+          <p:cNvSpPr>
+            <a:spLocks noGrp="1"/>
+          </p:cNvSpPr>
+          <p:nvPr>
+            <p:ph type="body" idx="1"/>
+          </p:nvPr>
+        </p:nvSpPr>
+        <p:spPr>
+          <a:xfrm>
+            <a:off x="2695832" y="214533"/>
+            <a:ext cx="8915399" cy="1555864"/>
+          </a:xfrm>
+        </p:spPr>
+        <p:txBody>
+          <a:bodyPr/>
+          <a:lstStyle/>
+          <a:p>
+            <a:endParaRPr lang="en-US" dirty="0"/>
+          </a:p>
+        </p:txBody>
+      </p:sp>
+      <p:pic>
+        <p:nvPicPr>
+          <p:cNvPr id="4" name="Gambar 3">
+            <a:extLst>
+              <a:ext uri="{FF2B5EF4-FFF2-40B4-BE49-F238E27FC236}">
+                <a16:creationId xmlns:a16="http://schemas.microsoft.com/office/drawing/2014/main" id="{1AF51DD5-196C-44C4-B77F-54E3C26EFF5F}"/>
+              </a:ext>
+            </a:extLst>
+          </p:cNvPr>
+          <p:cNvPicPr/>
+          <p:nvPr/>
+        </p:nvPicPr>
+        <p:blipFill>
+          <a:blip r:embed="rId2"/>
+          <a:stretch>
+            <a:fillRect/>
+          </a:stretch>
+        </p:blipFill>
+        <p:spPr>
+          <a:xfrm>
+            <a:off x="1638300" y="2379585"/>
+            <a:ext cx="8915399" cy="1797000"/>
+          </a:xfrm>
+          <a:prstGeom prst="rect">
+            <a:avLst/>
+          </a:prstGeom>
+        </p:spPr>
+      </p:pic>
+    </p:spTree>
+    <p:extLst>
+      <p:ext uri="{BB962C8B-B14F-4D97-AF65-F5344CB8AC3E}">
+        <p14:creationId xmlns:p14="http://schemas.microsoft.com/office/powerpoint/2010/main" val="1374993462"/>
+      </p:ext>
+    </p:extLst>
+  </p:cSld>
+  <p:clrMapOvr>
+    <a:masterClrMapping/>
+  </p:clrMapOvr>
+</p:sld>
+</file>
+
+<file path=ppt/slides/slide28.xml><?xml version="1.0" encoding="utf-8"?>
+<p:sld xmlns:a="http://schemas.openxmlformats.org/drawingml/2006/main" xmlns:r="http://schemas.openxmlformats.org/officeDocument/2006/relationships" xmlns:p="http://schemas.openxmlformats.org/presentationml/2006/main">
+  <p:cSld>
+    <p:spTree>
+      <p:nvGrpSpPr>
+        <p:cNvPr id="1" name=""/>
+        <p:cNvGrpSpPr/>
+        <p:nvPr/>
+      </p:nvGrpSpPr>
+      <p:grpSpPr>
+        <a:xfrm>
+          <a:off x="0" y="0"/>
+          <a:ext cx="0" cy="0"/>
+          <a:chOff x="0" y="0"/>
+          <a:chExt cx="0" cy="0"/>
+        </a:xfrm>
+      </p:grpSpPr>
+      <p:sp>
+        <p:nvSpPr>
+          <p:cNvPr id="3" name="Tampungan Teks 2">
+            <a:extLst>
+              <a:ext uri="{FF2B5EF4-FFF2-40B4-BE49-F238E27FC236}">
+                <a16:creationId xmlns:a16="http://schemas.microsoft.com/office/drawing/2014/main" id="{7C5E8486-B9AB-493B-A6A0-CEFCAB988425}"/>
+              </a:ext>
+            </a:extLst>
+          </p:cNvPr>
+          <p:cNvSpPr>
+            <a:spLocks noGrp="1"/>
+          </p:cNvSpPr>
+          <p:nvPr>
+            <p:ph type="body" idx="1"/>
+          </p:nvPr>
+        </p:nvSpPr>
+        <p:spPr>
+          <a:xfrm>
+            <a:off x="2589214" y="309765"/>
+            <a:ext cx="8915399" cy="1555864"/>
+          </a:xfrm>
+        </p:spPr>
+        <p:txBody>
+          <a:bodyPr/>
+          <a:lstStyle/>
+          <a:p>
+            <a:endParaRPr lang="en-US" dirty="0"/>
+          </a:p>
+        </p:txBody>
+      </p:sp>
+      <p:pic>
+        <p:nvPicPr>
+          <p:cNvPr id="4" name="Gambar 3">
+            <a:extLst>
+              <a:ext uri="{FF2B5EF4-FFF2-40B4-BE49-F238E27FC236}">
+                <a16:creationId xmlns:a16="http://schemas.microsoft.com/office/drawing/2014/main" id="{0392C333-B097-4965-B505-961412742C28}"/>
+              </a:ext>
+            </a:extLst>
+          </p:cNvPr>
+          <p:cNvPicPr/>
+          <p:nvPr/>
+        </p:nvPicPr>
+        <p:blipFill>
+          <a:blip r:embed="rId2"/>
+          <a:stretch>
+            <a:fillRect/>
+          </a:stretch>
+        </p:blipFill>
+        <p:spPr>
+          <a:xfrm>
+            <a:off x="1638301" y="1278804"/>
+            <a:ext cx="8915398" cy="4300392"/>
+          </a:xfrm>
+          <a:prstGeom prst="rect">
+            <a:avLst/>
+          </a:prstGeom>
+        </p:spPr>
+      </p:pic>
+    </p:spTree>
+    <p:extLst>
+      <p:ext uri="{BB962C8B-B14F-4D97-AF65-F5344CB8AC3E}">
+        <p14:creationId xmlns:p14="http://schemas.microsoft.com/office/powerpoint/2010/main" val="3082912626"/>
+      </p:ext>
+    </p:extLst>
+  </p:cSld>
+  <p:clrMapOvr>
+    <a:masterClrMapping/>
+  </p:clrMapOvr>
+</p:sld>
+</file>
+
+<file path=ppt/slides/slide29.xml><?xml version="1.0" encoding="utf-8"?>
+<p:sld xmlns:a="http://schemas.openxmlformats.org/drawingml/2006/main" xmlns:r="http://schemas.openxmlformats.org/officeDocument/2006/relationships" xmlns:p="http://schemas.openxmlformats.org/presentationml/2006/main">
+  <p:cSld>
+    <p:spTree>
+      <p:nvGrpSpPr>
+        <p:cNvPr id="1" name=""/>
+        <p:cNvGrpSpPr/>
+        <p:nvPr/>
+      </p:nvGrpSpPr>
+      <p:grpSpPr>
+        <a:xfrm>
+          <a:off x="0" y="0"/>
+          <a:ext cx="0" cy="0"/>
+          <a:chOff x="0" y="0"/>
+          <a:chExt cx="0" cy="0"/>
+        </a:xfrm>
+      </p:grpSpPr>
+      <p:sp>
+        <p:nvSpPr>
+          <p:cNvPr id="3" name="Tampungan Teks 2">
+            <a:extLst>
+              <a:ext uri="{FF2B5EF4-FFF2-40B4-BE49-F238E27FC236}">
+                <a16:creationId xmlns:a16="http://schemas.microsoft.com/office/drawing/2014/main" id="{B945CB34-1818-4F49-93E9-0CF27B8207CB}"/>
+              </a:ext>
+            </a:extLst>
+          </p:cNvPr>
+          <p:cNvSpPr>
+            <a:spLocks noGrp="1"/>
+          </p:cNvSpPr>
+          <p:nvPr>
+            <p:ph type="body" idx="1"/>
+          </p:nvPr>
+        </p:nvSpPr>
+        <p:spPr>
+          <a:xfrm>
+            <a:off x="2589212" y="449311"/>
+            <a:ext cx="8915399" cy="1555864"/>
+          </a:xfrm>
+        </p:spPr>
+        <p:txBody>
+          <a:bodyPr/>
+          <a:lstStyle/>
+          <a:p>
+            <a:endParaRPr lang="en-US" dirty="0"/>
+          </a:p>
+        </p:txBody>
+      </p:sp>
+      <p:pic>
+        <p:nvPicPr>
+          <p:cNvPr id="4" name="Gambar 3">
+            <a:extLst>
+              <a:ext uri="{FF2B5EF4-FFF2-40B4-BE49-F238E27FC236}">
+                <a16:creationId xmlns:a16="http://schemas.microsoft.com/office/drawing/2014/main" id="{0BCA26A1-2849-476D-AAE5-7885C55861B1}"/>
+              </a:ext>
+            </a:extLst>
+          </p:cNvPr>
+          <p:cNvPicPr/>
+          <p:nvPr/>
+        </p:nvPicPr>
+        <p:blipFill>
+          <a:blip r:embed="rId2"/>
+          <a:stretch>
+            <a:fillRect/>
+          </a:stretch>
+        </p:blipFill>
+        <p:spPr>
+          <a:xfrm>
+            <a:off x="1934304" y="2434366"/>
+            <a:ext cx="8915398" cy="2792542"/>
+          </a:xfrm>
+          <a:prstGeom prst="rect">
+            <a:avLst/>
+          </a:prstGeom>
+        </p:spPr>
+      </p:pic>
+    </p:spTree>
+    <p:extLst>
+      <p:ext uri="{BB962C8B-B14F-4D97-AF65-F5344CB8AC3E}">
+        <p14:creationId xmlns:p14="http://schemas.microsoft.com/office/powerpoint/2010/main" val="3043286507"/>
       </p:ext>
     </p:extLst>
   </p:cSld>
@@ -10325,6 +11109,779 @@
     <p:extLst>
       <p:ext uri="{BB962C8B-B14F-4D97-AF65-F5344CB8AC3E}">
         <p14:creationId xmlns:p14="http://schemas.microsoft.com/office/powerpoint/2010/main" val="986472340"/>
+      </p:ext>
+    </p:extLst>
+  </p:cSld>
+  <p:clrMapOvr>
+    <a:masterClrMapping/>
+  </p:clrMapOvr>
+</p:sld>
+</file>
+
+<file path=ppt/slides/slide30.xml><?xml version="1.0" encoding="utf-8"?>
+<p:sld xmlns:a="http://schemas.openxmlformats.org/drawingml/2006/main" xmlns:r="http://schemas.openxmlformats.org/officeDocument/2006/relationships" xmlns:p="http://schemas.openxmlformats.org/presentationml/2006/main">
+  <p:cSld>
+    <p:spTree>
+      <p:nvGrpSpPr>
+        <p:cNvPr id="1" name=""/>
+        <p:cNvGrpSpPr/>
+        <p:nvPr/>
+      </p:nvGrpSpPr>
+      <p:grpSpPr>
+        <a:xfrm>
+          <a:off x="0" y="0"/>
+          <a:ext cx="0" cy="0"/>
+          <a:chOff x="0" y="0"/>
+          <a:chExt cx="0" cy="0"/>
+        </a:xfrm>
+      </p:grpSpPr>
+      <p:sp>
+        <p:nvSpPr>
+          <p:cNvPr id="2" name="Judul 1">
+            <a:extLst>
+              <a:ext uri="{FF2B5EF4-FFF2-40B4-BE49-F238E27FC236}">
+                <a16:creationId xmlns:a16="http://schemas.microsoft.com/office/drawing/2014/main" id="{EFC84874-0AEA-4718-986F-30387F5C540D}"/>
+              </a:ext>
+            </a:extLst>
+          </p:cNvPr>
+          <p:cNvSpPr>
+            <a:spLocks noGrp="1"/>
+          </p:cNvSpPr>
+          <p:nvPr>
+            <p:ph type="title"/>
+          </p:nvPr>
+        </p:nvSpPr>
+        <p:spPr>
+          <a:xfrm>
+            <a:off x="2589212" y="609600"/>
+            <a:ext cx="8915399" cy="1194486"/>
+          </a:xfrm>
+        </p:spPr>
+        <p:txBody>
+          <a:bodyPr/>
+          <a:lstStyle/>
+          <a:p>
+            <a:pPr algn="ctr"/>
+            <a:r>
+              <a:rPr lang="id-ID" b="1" dirty="0" err="1"/>
+              <a:t>Seaborn</a:t>
+            </a:r>
+            <a:endParaRPr lang="en-US" b="1" dirty="0"/>
+          </a:p>
+        </p:txBody>
+      </p:sp>
+      <p:sp>
+        <p:nvSpPr>
+          <p:cNvPr id="3" name="Tampungan Teks 2">
+            <a:extLst>
+              <a:ext uri="{FF2B5EF4-FFF2-40B4-BE49-F238E27FC236}">
+                <a16:creationId xmlns:a16="http://schemas.microsoft.com/office/drawing/2014/main" id="{BCB2119B-2CA6-4C12-966E-1BEB494A145B}"/>
+              </a:ext>
+            </a:extLst>
+          </p:cNvPr>
+          <p:cNvSpPr>
+            <a:spLocks noGrp="1"/>
+          </p:cNvSpPr>
+          <p:nvPr>
+            <p:ph type="body" idx="1"/>
+          </p:nvPr>
+        </p:nvSpPr>
+        <p:spPr>
+          <a:xfrm>
+            <a:off x="2589212" y="2006262"/>
+            <a:ext cx="8915399" cy="1555864"/>
+          </a:xfrm>
+        </p:spPr>
+        <p:txBody>
+          <a:bodyPr/>
+          <a:lstStyle/>
+          <a:p>
+            <a:pPr algn="just"/>
+            <a:r>
+              <a:rPr lang="en-US" dirty="0">
+                <a:solidFill>
+                  <a:schemeClr val="tx1"/>
+                </a:solidFill>
+              </a:rPr>
+              <a:t>Seaborn </a:t>
+            </a:r>
+            <a:r>
+              <a:rPr lang="en-US" dirty="0" err="1">
+                <a:solidFill>
+                  <a:schemeClr val="tx1"/>
+                </a:solidFill>
+              </a:rPr>
+              <a:t>adalah</a:t>
+            </a:r>
+            <a:r>
+              <a:rPr lang="en-US" dirty="0">
+                <a:solidFill>
+                  <a:schemeClr val="tx1"/>
+                </a:solidFill>
+              </a:rPr>
+              <a:t> library </a:t>
+            </a:r>
+            <a:r>
+              <a:rPr lang="en-US" dirty="0" err="1">
+                <a:solidFill>
+                  <a:schemeClr val="tx1"/>
+                </a:solidFill>
+              </a:rPr>
+              <a:t>untuk</a:t>
+            </a:r>
+            <a:r>
+              <a:rPr lang="en-US" dirty="0">
+                <a:solidFill>
+                  <a:schemeClr val="tx1"/>
+                </a:solidFill>
+              </a:rPr>
+              <a:t> </a:t>
+            </a:r>
+            <a:r>
+              <a:rPr lang="en-US" dirty="0" err="1">
+                <a:solidFill>
+                  <a:schemeClr val="tx1"/>
+                </a:solidFill>
+              </a:rPr>
+              <a:t>membuat</a:t>
+            </a:r>
+            <a:r>
+              <a:rPr lang="en-US" dirty="0">
+                <a:solidFill>
+                  <a:schemeClr val="tx1"/>
+                </a:solidFill>
+              </a:rPr>
+              <a:t> </a:t>
+            </a:r>
+            <a:r>
+              <a:rPr lang="en-US" dirty="0" err="1">
+                <a:solidFill>
+                  <a:schemeClr val="tx1"/>
+                </a:solidFill>
+              </a:rPr>
+              <a:t>grafik</a:t>
+            </a:r>
+            <a:r>
+              <a:rPr lang="en-US" dirty="0">
+                <a:solidFill>
+                  <a:schemeClr val="tx1"/>
+                </a:solidFill>
+              </a:rPr>
+              <a:t> </a:t>
+            </a:r>
+            <a:r>
+              <a:rPr lang="en-US" dirty="0" err="1">
+                <a:solidFill>
+                  <a:schemeClr val="tx1"/>
+                </a:solidFill>
+              </a:rPr>
+              <a:t>statistik</a:t>
+            </a:r>
+            <a:r>
+              <a:rPr lang="en-US" dirty="0">
+                <a:solidFill>
+                  <a:schemeClr val="tx1"/>
+                </a:solidFill>
+              </a:rPr>
+              <a:t> yang </a:t>
+            </a:r>
+            <a:r>
+              <a:rPr lang="en-US" dirty="0" err="1">
+                <a:solidFill>
+                  <a:schemeClr val="tx1"/>
+                </a:solidFill>
+              </a:rPr>
+              <a:t>menarik</a:t>
+            </a:r>
+            <a:r>
+              <a:rPr lang="en-US" dirty="0">
+                <a:solidFill>
+                  <a:schemeClr val="tx1"/>
+                </a:solidFill>
+              </a:rPr>
+              <a:t> dan </a:t>
+            </a:r>
+            <a:r>
+              <a:rPr lang="en-US" dirty="0" err="1">
+                <a:solidFill>
+                  <a:schemeClr val="tx1"/>
+                </a:solidFill>
+              </a:rPr>
+              <a:t>informatif</a:t>
+            </a:r>
+            <a:r>
+              <a:rPr lang="en-US" dirty="0">
+                <a:solidFill>
+                  <a:schemeClr val="tx1"/>
+                </a:solidFill>
+              </a:rPr>
+              <a:t> </a:t>
+            </a:r>
+            <a:r>
+              <a:rPr lang="en-US" dirty="0" err="1">
+                <a:solidFill>
+                  <a:schemeClr val="tx1"/>
+                </a:solidFill>
+              </a:rPr>
+              <a:t>dengan</a:t>
+            </a:r>
+            <a:r>
+              <a:rPr lang="en-US" dirty="0">
+                <a:solidFill>
+                  <a:schemeClr val="tx1"/>
+                </a:solidFill>
+              </a:rPr>
+              <a:t> Python. Hal </a:t>
+            </a:r>
+            <a:r>
+              <a:rPr lang="en-US" dirty="0" err="1">
+                <a:solidFill>
+                  <a:schemeClr val="tx1"/>
+                </a:solidFill>
+              </a:rPr>
+              <a:t>ini</a:t>
+            </a:r>
+            <a:r>
+              <a:rPr lang="en-US" dirty="0">
+                <a:solidFill>
+                  <a:schemeClr val="tx1"/>
+                </a:solidFill>
+              </a:rPr>
+              <a:t> </a:t>
+            </a:r>
+            <a:r>
+              <a:rPr lang="en-US" dirty="0" err="1">
+                <a:solidFill>
+                  <a:schemeClr val="tx1"/>
+                </a:solidFill>
+              </a:rPr>
+              <a:t>dibangun</a:t>
+            </a:r>
+            <a:r>
+              <a:rPr lang="en-US" dirty="0">
+                <a:solidFill>
+                  <a:schemeClr val="tx1"/>
+                </a:solidFill>
+              </a:rPr>
+              <a:t> di </a:t>
+            </a:r>
+            <a:r>
+              <a:rPr lang="en-US" dirty="0" err="1">
+                <a:solidFill>
+                  <a:schemeClr val="tx1"/>
+                </a:solidFill>
+              </a:rPr>
+              <a:t>atas</a:t>
+            </a:r>
+            <a:r>
+              <a:rPr lang="en-US" dirty="0">
+                <a:solidFill>
+                  <a:schemeClr val="tx1"/>
+                </a:solidFill>
+              </a:rPr>
+              <a:t> matplotlib dan </a:t>
+            </a:r>
+            <a:r>
+              <a:rPr lang="en-US" dirty="0" err="1">
+                <a:solidFill>
+                  <a:schemeClr val="tx1"/>
+                </a:solidFill>
+              </a:rPr>
+              <a:t>terintegrasi</a:t>
+            </a:r>
+            <a:r>
+              <a:rPr lang="en-US" dirty="0">
+                <a:solidFill>
+                  <a:schemeClr val="tx1"/>
+                </a:solidFill>
+              </a:rPr>
+              <a:t> </a:t>
+            </a:r>
+            <a:r>
+              <a:rPr lang="en-US" dirty="0" err="1">
+                <a:solidFill>
+                  <a:schemeClr val="tx1"/>
+                </a:solidFill>
+              </a:rPr>
+              <a:t>dengan</a:t>
+            </a:r>
+            <a:r>
+              <a:rPr lang="en-US" dirty="0">
+                <a:solidFill>
+                  <a:schemeClr val="tx1"/>
+                </a:solidFill>
+              </a:rPr>
+              <a:t> </a:t>
+            </a:r>
+            <a:r>
+              <a:rPr lang="en-US" dirty="0" err="1">
+                <a:solidFill>
+                  <a:schemeClr val="tx1"/>
+                </a:solidFill>
+              </a:rPr>
+              <a:t>Py</a:t>
+            </a:r>
+            <a:r>
+              <a:rPr lang="en-US" dirty="0">
+                <a:solidFill>
+                  <a:schemeClr val="tx1"/>
+                </a:solidFill>
+              </a:rPr>
+              <a:t> Data stack, </a:t>
+            </a:r>
+            <a:r>
+              <a:rPr lang="en-US" dirty="0" err="1">
+                <a:solidFill>
+                  <a:schemeClr val="tx1"/>
+                </a:solidFill>
+              </a:rPr>
+              <a:t>termasuk</a:t>
+            </a:r>
+            <a:r>
+              <a:rPr lang="en-US" dirty="0">
+                <a:solidFill>
+                  <a:schemeClr val="tx1"/>
+                </a:solidFill>
+              </a:rPr>
+              <a:t> </a:t>
+            </a:r>
+            <a:r>
+              <a:rPr lang="en-US" dirty="0" err="1">
+                <a:solidFill>
+                  <a:schemeClr val="tx1"/>
+                </a:solidFill>
+              </a:rPr>
+              <a:t>dukungan</a:t>
+            </a:r>
+            <a:r>
+              <a:rPr lang="en-US" dirty="0">
+                <a:solidFill>
+                  <a:schemeClr val="tx1"/>
+                </a:solidFill>
+              </a:rPr>
+              <a:t> </a:t>
+            </a:r>
+            <a:r>
+              <a:rPr lang="en-US" dirty="0" err="1">
+                <a:solidFill>
+                  <a:schemeClr val="tx1"/>
+                </a:solidFill>
+              </a:rPr>
+              <a:t>untuk</a:t>
+            </a:r>
+            <a:r>
+              <a:rPr lang="en-US" dirty="0">
+                <a:solidFill>
+                  <a:schemeClr val="tx1"/>
+                </a:solidFill>
+              </a:rPr>
+              <a:t> </a:t>
+            </a:r>
+            <a:r>
+              <a:rPr lang="en-US" dirty="0" err="1">
+                <a:solidFill>
+                  <a:schemeClr val="tx1"/>
+                </a:solidFill>
+              </a:rPr>
+              <a:t>numpy</a:t>
+            </a:r>
+            <a:r>
+              <a:rPr lang="en-US" dirty="0">
+                <a:solidFill>
+                  <a:schemeClr val="tx1"/>
+                </a:solidFill>
+              </a:rPr>
+              <a:t> dan data panda </a:t>
+            </a:r>
+            <a:r>
+              <a:rPr lang="en-US" dirty="0" err="1">
+                <a:solidFill>
+                  <a:schemeClr val="tx1"/>
+                </a:solidFill>
+              </a:rPr>
+              <a:t>struktur</a:t>
+            </a:r>
+            <a:r>
+              <a:rPr lang="en-US" dirty="0">
+                <a:solidFill>
+                  <a:schemeClr val="tx1"/>
+                </a:solidFill>
+              </a:rPr>
+              <a:t> dan </a:t>
+            </a:r>
+            <a:r>
+              <a:rPr lang="en-US" dirty="0" err="1">
+                <a:solidFill>
+                  <a:schemeClr val="tx1"/>
+                </a:solidFill>
+              </a:rPr>
+              <a:t>rutinitas</a:t>
+            </a:r>
+            <a:r>
+              <a:rPr lang="en-US" dirty="0">
+                <a:solidFill>
+                  <a:schemeClr val="tx1"/>
+                </a:solidFill>
+              </a:rPr>
+              <a:t> </a:t>
+            </a:r>
+            <a:r>
+              <a:rPr lang="en-US" dirty="0" err="1">
+                <a:solidFill>
+                  <a:schemeClr val="tx1"/>
+                </a:solidFill>
+              </a:rPr>
+              <a:t>statistik</a:t>
+            </a:r>
+            <a:r>
+              <a:rPr lang="en-US" dirty="0">
+                <a:solidFill>
+                  <a:schemeClr val="tx1"/>
+                </a:solidFill>
+              </a:rPr>
+              <a:t> </a:t>
+            </a:r>
+            <a:r>
+              <a:rPr lang="en-US" dirty="0" err="1">
+                <a:solidFill>
+                  <a:schemeClr val="tx1"/>
+                </a:solidFill>
+              </a:rPr>
+              <a:t>dari</a:t>
+            </a:r>
+            <a:r>
+              <a:rPr lang="en-US" dirty="0">
+                <a:solidFill>
+                  <a:schemeClr val="tx1"/>
+                </a:solidFill>
+              </a:rPr>
+              <a:t> </a:t>
+            </a:r>
+            <a:r>
+              <a:rPr lang="en-US" dirty="0" err="1">
+                <a:solidFill>
+                  <a:schemeClr val="tx1"/>
+                </a:solidFill>
+              </a:rPr>
+              <a:t>scipy</a:t>
+            </a:r>
+            <a:r>
+              <a:rPr lang="en-US" dirty="0">
+                <a:solidFill>
+                  <a:schemeClr val="tx1"/>
+                </a:solidFill>
+              </a:rPr>
+              <a:t> dan stats models</a:t>
+            </a:r>
+          </a:p>
+        </p:txBody>
+      </p:sp>
+    </p:spTree>
+    <p:extLst>
+      <p:ext uri="{BB962C8B-B14F-4D97-AF65-F5344CB8AC3E}">
+        <p14:creationId xmlns:p14="http://schemas.microsoft.com/office/powerpoint/2010/main" val="1447720284"/>
+      </p:ext>
+    </p:extLst>
+  </p:cSld>
+  <p:clrMapOvr>
+    <a:masterClrMapping/>
+  </p:clrMapOvr>
+</p:sld>
+</file>
+
+<file path=ppt/slides/slide31.xml><?xml version="1.0" encoding="utf-8"?>
+<p:sld xmlns:a="http://schemas.openxmlformats.org/drawingml/2006/main" xmlns:r="http://schemas.openxmlformats.org/officeDocument/2006/relationships" xmlns:p="http://schemas.openxmlformats.org/presentationml/2006/main">
+  <p:cSld>
+    <p:spTree>
+      <p:nvGrpSpPr>
+        <p:cNvPr id="1" name=""/>
+        <p:cNvGrpSpPr/>
+        <p:nvPr/>
+      </p:nvGrpSpPr>
+      <p:grpSpPr>
+        <a:xfrm>
+          <a:off x="0" y="0"/>
+          <a:ext cx="0" cy="0"/>
+          <a:chOff x="0" y="0"/>
+          <a:chExt cx="0" cy="0"/>
+        </a:xfrm>
+      </p:grpSpPr>
+      <p:sp>
+        <p:nvSpPr>
+          <p:cNvPr id="3" name="Tampungan Teks 2">
+            <a:extLst>
+              <a:ext uri="{FF2B5EF4-FFF2-40B4-BE49-F238E27FC236}">
+                <a16:creationId xmlns:a16="http://schemas.microsoft.com/office/drawing/2014/main" id="{6EA0CB21-4BA3-4926-90F0-4481067051A6}"/>
+              </a:ext>
+            </a:extLst>
+          </p:cNvPr>
+          <p:cNvSpPr>
+            <a:spLocks noGrp="1"/>
+          </p:cNvSpPr>
+          <p:nvPr>
+            <p:ph type="body" idx="1"/>
+          </p:nvPr>
+        </p:nvSpPr>
+        <p:spPr>
+          <a:xfrm>
+            <a:off x="2589210" y="1527380"/>
+            <a:ext cx="8915399" cy="613719"/>
+          </a:xfrm>
+        </p:spPr>
+        <p:txBody>
+          <a:bodyPr/>
+          <a:lstStyle/>
+          <a:p>
+            <a:endParaRPr lang="en-US" b="1" dirty="0"/>
+          </a:p>
+        </p:txBody>
+      </p:sp>
+      <p:pic>
+        <p:nvPicPr>
+          <p:cNvPr id="4" name="Gambar 3">
+            <a:extLst>
+              <a:ext uri="{FF2B5EF4-FFF2-40B4-BE49-F238E27FC236}">
+                <a16:creationId xmlns:a16="http://schemas.microsoft.com/office/drawing/2014/main" id="{1B22424B-A1C9-4715-BC92-07ED136A49AF}"/>
+              </a:ext>
+            </a:extLst>
+          </p:cNvPr>
+          <p:cNvPicPr/>
+          <p:nvPr/>
+        </p:nvPicPr>
+        <p:blipFill>
+          <a:blip r:embed="rId2"/>
+          <a:stretch>
+            <a:fillRect/>
+          </a:stretch>
+        </p:blipFill>
+        <p:spPr>
+          <a:xfrm>
+            <a:off x="1638300" y="1527380"/>
+            <a:ext cx="8915399" cy="4520923"/>
+          </a:xfrm>
+          <a:prstGeom prst="rect">
+            <a:avLst/>
+          </a:prstGeom>
+        </p:spPr>
+      </p:pic>
+      <p:sp>
+        <p:nvSpPr>
+          <p:cNvPr id="5" name="Judul 1">
+            <a:extLst>
+              <a:ext uri="{FF2B5EF4-FFF2-40B4-BE49-F238E27FC236}">
+                <a16:creationId xmlns:a16="http://schemas.microsoft.com/office/drawing/2014/main" id="{D06DF7B6-7B2E-4286-B67C-3FAF356733F6}"/>
+              </a:ext>
+            </a:extLst>
+          </p:cNvPr>
+          <p:cNvSpPr>
+            <a:spLocks noGrp="1"/>
+          </p:cNvSpPr>
+          <p:nvPr>
+            <p:ph type="title"/>
+          </p:nvPr>
+        </p:nvSpPr>
+        <p:spPr>
+          <a:xfrm>
+            <a:off x="2589208" y="696097"/>
+            <a:ext cx="8915399" cy="613719"/>
+          </a:xfrm>
+        </p:spPr>
+        <p:txBody>
+          <a:bodyPr>
+            <a:noAutofit/>
+          </a:bodyPr>
+          <a:lstStyle/>
+          <a:p>
+            <a:r>
+              <a:rPr lang="id-ID" sz="4300" b="1" dirty="0"/>
+              <a:t>Instalasi </a:t>
+            </a:r>
+            <a:r>
+              <a:rPr lang="id-ID" sz="4300" b="1" dirty="0" err="1"/>
+              <a:t>Seaborn</a:t>
+            </a:r>
+            <a:r>
+              <a:rPr lang="id-ID" sz="4300" b="1" dirty="0"/>
+              <a:t> Pada </a:t>
+            </a:r>
+            <a:r>
+              <a:rPr lang="id-ID" sz="4300" b="1" dirty="0" err="1"/>
+              <a:t>Pyhton</a:t>
+            </a:r>
+            <a:endParaRPr lang="en-US" sz="4300" b="1" dirty="0"/>
+          </a:p>
+        </p:txBody>
+      </p:sp>
+    </p:spTree>
+    <p:extLst>
+      <p:ext uri="{BB962C8B-B14F-4D97-AF65-F5344CB8AC3E}">
+        <p14:creationId xmlns:p14="http://schemas.microsoft.com/office/powerpoint/2010/main" val="227356613"/>
+      </p:ext>
+    </p:extLst>
+  </p:cSld>
+  <p:clrMapOvr>
+    <a:masterClrMapping/>
+  </p:clrMapOvr>
+</p:sld>
+</file>
+
+<file path=ppt/slides/slide32.xml><?xml version="1.0" encoding="utf-8"?>
+<p:sld xmlns:a="http://schemas.openxmlformats.org/drawingml/2006/main" xmlns:r="http://schemas.openxmlformats.org/officeDocument/2006/relationships" xmlns:p="http://schemas.openxmlformats.org/presentationml/2006/main">
+  <p:cSld>
+    <p:spTree>
+      <p:nvGrpSpPr>
+        <p:cNvPr id="1" name=""/>
+        <p:cNvGrpSpPr/>
+        <p:nvPr/>
+      </p:nvGrpSpPr>
+      <p:grpSpPr>
+        <a:xfrm>
+          <a:off x="0" y="0"/>
+          <a:ext cx="0" cy="0"/>
+          <a:chOff x="0" y="0"/>
+          <a:chExt cx="0" cy="0"/>
+        </a:xfrm>
+      </p:grpSpPr>
+      <p:sp>
+        <p:nvSpPr>
+          <p:cNvPr id="2" name="Title 1"/>
+          <p:cNvSpPr>
+            <a:spLocks noGrp="1"/>
+          </p:cNvSpPr>
+          <p:nvPr>
+            <p:ph type="title"/>
+          </p:nvPr>
+        </p:nvSpPr>
+        <p:spPr/>
+        <p:txBody>
+          <a:bodyPr/>
+          <a:lstStyle/>
+          <a:p>
+            <a:r>
+              <a:rPr lang="en-US" dirty="0" err="1"/>
+              <a:t>Sumber</a:t>
+            </a:r>
+            <a:endParaRPr lang="en-US" dirty="0"/>
+          </a:p>
+        </p:txBody>
+      </p:sp>
+      <p:sp>
+        <p:nvSpPr>
+          <p:cNvPr id="3" name="Content Placeholder 2"/>
+          <p:cNvSpPr>
+            <a:spLocks noGrp="1"/>
+          </p:cNvSpPr>
+          <p:nvPr>
+            <p:ph idx="1"/>
+          </p:nvPr>
+        </p:nvSpPr>
+        <p:spPr>
+          <a:xfrm>
+            <a:off x="1141412" y="2478157"/>
+            <a:ext cx="9905999" cy="3856382"/>
+          </a:xfrm>
+        </p:spPr>
+        <p:txBody>
+          <a:bodyPr>
+            <a:normAutofit fontScale="92500"/>
+          </a:bodyPr>
+          <a:lstStyle/>
+          <a:p>
+            <a:r>
+              <a:rPr lang="en-US" dirty="0">
+                <a:hlinkClick r:id="rId2"/>
+              </a:rPr>
+              <a:t>https://en.wikipedia.org/wiki/Pip_(package_manager)</a:t>
+            </a:r>
+            <a:endParaRPr lang="en-US" dirty="0"/>
+          </a:p>
+          <a:p>
+            <a:r>
+              <a:rPr lang="en-US" dirty="0">
+                <a:hlinkClick r:id="rId3"/>
+              </a:rPr>
+              <a:t>https://www.advernesia.com/blog/python/cara-install-python-di-windows-lengkap/</a:t>
+            </a:r>
+            <a:endParaRPr lang="en-US" dirty="0"/>
+          </a:p>
+          <a:p>
+            <a:r>
+              <a:rPr lang="en-US" dirty="0">
+                <a:hlinkClick r:id="rId4"/>
+              </a:rPr>
+              <a:t>https://www.petanikode.com/python-windows/</a:t>
+            </a:r>
+            <a:endParaRPr lang="en-US" dirty="0"/>
+          </a:p>
+          <a:p>
+            <a:r>
+              <a:rPr lang="en-US" dirty="0">
+                <a:hlinkClick r:id="rId5"/>
+              </a:rPr>
+              <a:t>https://belajarpython.com/tutorial/tipe-data-python</a:t>
+            </a:r>
+            <a:endParaRPr lang="en-US" dirty="0"/>
+          </a:p>
+          <a:p>
+            <a:r>
+              <a:rPr lang="en-US" dirty="0">
+                <a:hlinkClick r:id="rId6"/>
+              </a:rPr>
+              <a:t>https://hiwijaya.com/blog/struktur-data-python/</a:t>
+            </a:r>
+            <a:endParaRPr lang="en-US" dirty="0"/>
+          </a:p>
+          <a:p>
+            <a:r>
+              <a:rPr lang="en-US" dirty="0">
+                <a:hlinkClick r:id="rId7"/>
+              </a:rPr>
+              <a:t>http://sakti.github.io/python101/struktur_data.html</a:t>
+            </a:r>
+            <a:endParaRPr lang="id-ID" dirty="0"/>
+          </a:p>
+          <a:p>
+            <a:r>
+              <a:rPr lang="id-ID" dirty="0">
+                <a:hlinkClick r:id="rId8"/>
+              </a:rPr>
+              <a:t>https://github.com/ardeabagas22/Pengantar-Deep-Learning</a:t>
+            </a:r>
+            <a:r>
+              <a:rPr lang="id-ID" dirty="0"/>
+              <a:t> </a:t>
+            </a:r>
+          </a:p>
+          <a:p>
+            <a:r>
+              <a:rPr lang="id-ID" dirty="0">
+                <a:hlinkClick r:id="rId9"/>
+              </a:rPr>
+              <a:t>https://github.com/RizkyNugraha46/Pengantar-Deep-Learning</a:t>
+            </a:r>
+            <a:endParaRPr lang="id-ID" dirty="0"/>
+          </a:p>
+          <a:p>
+            <a:pPr marL="0" indent="0">
+              <a:buNone/>
+            </a:pPr>
+            <a:endParaRPr lang="id-ID" dirty="0"/>
+          </a:p>
+          <a:p>
+            <a:endParaRPr lang="en-US" dirty="0"/>
+          </a:p>
+          <a:p>
+            <a:endParaRPr lang="en-US" dirty="0"/>
+          </a:p>
+          <a:p>
+            <a:endParaRPr lang="en-US" dirty="0"/>
+          </a:p>
+        </p:txBody>
+      </p:sp>
+    </p:spTree>
+    <p:extLst>
+      <p:ext uri="{BB962C8B-B14F-4D97-AF65-F5344CB8AC3E}">
+        <p14:creationId xmlns:p14="http://schemas.microsoft.com/office/powerpoint/2010/main" val="692436605"/>
       </p:ext>
     </p:extLst>
   </p:cSld>

</xml_diff>